<commit_message>
Remove locate from the explained commands, because it needs updatedb to work
</commit_message>
<xml_diff>
--- a/presentation/Bash.pptx
+++ b/presentation/Bash.pptx
@@ -339,7 +339,7 @@
                   <a:schemeClr val="tx2"/>
                 </a:solidFill>
               </a:rPr>
-              <a:t>18.02.2020</a:t>
+              <a:t>19.02.2020</a:t>
             </a:fld>
             <a:endParaRPr lang="de-DE">
               <a:solidFill>
@@ -689,7 +689,7 @@
             <a:fld id="{B4113CCE-1A1A-46DB-884A-AE560F65C3AF}" type="datetimeFigureOut">
               <a:rPr lang="de-DE" smtClean="0"/>
               <a:pPr/>
-              <a:t>18.02.2020</a:t>
+              <a:t>19.02.2020</a:t>
             </a:fld>
             <a:endParaRPr lang="de-DE"/>
           </a:p>
@@ -11911,38 +11911,6 @@
           </a:p>
           <a:p>
             <a:r>
-              <a:rPr lang="de-DE" dirty="0"/>
-              <a:t>LOCATE:</a:t>
-            </a:r>
-            <a:r>
-              <a:rPr lang="de-DE" baseline="0" dirty="0"/>
-              <a:t> Verwendet den Suchindex (und findet möglicherweise Dateien nicht, weil sie noch nicht im Suchindex sind)</a:t>
-            </a:r>
-          </a:p>
-          <a:p>
-            <a:r>
-              <a:rPr lang="de-DE" baseline="0" dirty="0"/>
-              <a:t>Auf neuen Versionen von </a:t>
-            </a:r>
-            <a:r>
-              <a:rPr lang="de-DE" baseline="0" dirty="0" err="1"/>
-              <a:t>Raspbian</a:t>
-            </a:r>
-            <a:r>
-              <a:rPr lang="de-DE" baseline="0" dirty="0"/>
-              <a:t> ist </a:t>
-            </a:r>
-            <a:r>
-              <a:rPr lang="de-DE" baseline="0" dirty="0" err="1"/>
-              <a:t>locate</a:t>
-            </a:r>
-            <a:r>
-              <a:rPr lang="de-DE" baseline="0" dirty="0"/>
-              <a:t> nicht mehr vorinstalliert</a:t>
-            </a:r>
-          </a:p>
-          <a:p>
-            <a:r>
               <a:rPr lang="de-DE" baseline="0" dirty="0"/>
               <a:t>WHICH: Sucht nur nach ausführbaren Programmen im Pfad (ähnlich zur %Path% Variable in Windows)</a:t>
             </a:r>
@@ -14959,7 +14927,7 @@
           <a:p>
             <a:fld id="{366C6F3F-2459-4D70-9926-FB42BF728FA6}" type="datetime1">
               <a:rPr lang="de-DE" smtClean="0"/>
-              <a:t>18.02.2020</a:t>
+              <a:t>19.02.2020</a:t>
             </a:fld>
             <a:endParaRPr lang="de-DE"/>
           </a:p>
@@ -15083,7 +15051,7 @@
           <a:p>
             <a:fld id="{8EB94C85-1664-4A48-98AC-8DF753D25A29}" type="datetime1">
               <a:rPr lang="de-DE" smtClean="0"/>
-              <a:t>18.02.2020</a:t>
+              <a:t>19.02.2020</a:t>
             </a:fld>
             <a:endParaRPr lang="de-DE"/>
           </a:p>
@@ -15216,7 +15184,7 @@
           <a:p>
             <a:fld id="{691FC979-3F94-4691-BC89-32D13FC7EBCE}" type="datetime1">
               <a:rPr lang="de-DE" smtClean="0"/>
-              <a:t>18.02.2020</a:t>
+              <a:t>19.02.2020</a:t>
             </a:fld>
             <a:endParaRPr lang="de-DE"/>
           </a:p>
@@ -15584,7 +15552,7 @@
           <a:p>
             <a:fld id="{CBC55DA8-7BFB-46FD-BBA5-A6DF63369D11}" type="datetime1">
               <a:rPr lang="de-DE" smtClean="0"/>
-              <a:t>18.02.2020</a:t>
+              <a:t>19.02.2020</a:t>
             </a:fld>
             <a:endParaRPr lang="de-DE"/>
           </a:p>
@@ -15765,7 +15733,7 @@
           <a:p>
             <a:fld id="{08AC7274-303B-40A0-A9B4-04FCC19861B5}" type="datetime1">
               <a:rPr lang="de-DE" smtClean="0"/>
-              <a:t>18.02.2020</a:t>
+              <a:t>19.02.2020</a:t>
             </a:fld>
             <a:endParaRPr lang="de-DE"/>
           </a:p>
@@ -15885,7 +15853,7 @@
           <a:p>
             <a:fld id="{04273802-5659-48BC-9FAF-5DEA6D19D2B7}" type="datetime1">
               <a:rPr lang="de-DE" smtClean="0"/>
-              <a:t>18.02.2020</a:t>
+              <a:t>19.02.2020</a:t>
             </a:fld>
             <a:endParaRPr lang="de-DE"/>
           </a:p>
@@ -15983,7 +15951,7 @@
           <a:p>
             <a:fld id="{A879DCBB-93B0-44A3-BD1F-0C3535CA8699}" type="datetime1">
               <a:rPr lang="de-DE" smtClean="0"/>
-              <a:t>18.02.2020</a:t>
+              <a:t>19.02.2020</a:t>
             </a:fld>
             <a:endParaRPr lang="de-DE"/>
           </a:p>
@@ -16107,7 +16075,7 @@
           <a:p>
             <a:fld id="{D6ACE559-FDBB-41B1-8D4B-DC9AA86538CE}" type="datetime1">
               <a:rPr lang="de-DE" smtClean="0"/>
-              <a:t>18.02.2020</a:t>
+              <a:t>19.02.2020</a:t>
             </a:fld>
             <a:endParaRPr lang="de-DE"/>
           </a:p>
@@ -16255,7 +16223,7 @@
           <a:p>
             <a:fld id="{A17D5A13-5CB3-48F6-94E4-1D24B0CCAADA}" type="datetime1">
               <a:rPr lang="de-DE" smtClean="0"/>
-              <a:t>18.02.2020</a:t>
+              <a:t>19.02.2020</a:t>
             </a:fld>
             <a:endParaRPr lang="de-DE"/>
           </a:p>
@@ -16454,7 +16422,7 @@
           <a:p>
             <a:fld id="{7FDE578D-883C-4F1A-917B-4C2253C6F4AE}" type="datetime1">
               <a:rPr lang="de-DE" smtClean="0"/>
-              <a:t>18.02.2020</a:t>
+              <a:t>19.02.2020</a:t>
             </a:fld>
             <a:endParaRPr lang="de-DE"/>
           </a:p>
@@ -16653,7 +16621,7 @@
           <a:p>
             <a:fld id="{37592AC1-A45D-4C86-A646-7D7AA3CA8F0F}" type="datetime1">
               <a:rPr lang="de-DE" smtClean="0"/>
-              <a:t>18.02.2020</a:t>
+              <a:t>19.02.2020</a:t>
             </a:fld>
             <a:endParaRPr lang="de-DE"/>
           </a:p>
@@ -17068,7 +17036,7 @@
           <a:p>
             <a:fld id="{6EF8A41A-F013-46F9-A1B7-9C788DB16844}" type="datetime1">
               <a:rPr lang="de-DE" smtClean="0"/>
-              <a:t>18.02.2020</a:t>
+              <a:t>19.02.2020</a:t>
             </a:fld>
             <a:endParaRPr lang="de-DE" dirty="0"/>
           </a:p>
@@ -17643,7 +17611,7 @@
           <a:p>
             <a:fld id="{F6A23D30-8385-4740-BFA9-93717CB1115D}" type="datetime1">
               <a:rPr lang="de-DE" smtClean="0"/>
-              <a:t>18.02.2020</a:t>
+              <a:t>19.02.2020</a:t>
             </a:fld>
             <a:endParaRPr lang="de-DE" dirty="0"/>
           </a:p>
@@ -18279,7 +18247,7 @@
           <a:p>
             <a:fld id="{DEAE0D00-77B9-479C-AA25-1CC77788EEA5}" type="datetime1">
               <a:rPr lang="de-DE" smtClean="0"/>
-              <a:t>18.02.2020</a:t>
+              <a:t>19.02.2020</a:t>
             </a:fld>
             <a:endParaRPr lang="de-DE"/>
           </a:p>
@@ -18377,7 +18345,7 @@
           <a:p>
             <a:fld id="{691FC979-3F94-4691-BC89-32D13FC7EBCE}" type="datetime1">
               <a:rPr lang="de-DE" smtClean="0"/>
-              <a:t>18.02.2020</a:t>
+              <a:t>19.02.2020</a:t>
             </a:fld>
             <a:endParaRPr lang="de-DE"/>
           </a:p>
@@ -18495,131 +18463,6 @@
                 <a:latin typeface="Consolas" panose="020B0609020204030204" pitchFamily="49" charset="0"/>
               </a:rPr>
               <a:t>"</a:t>
-            </a:r>
-          </a:p>
-          <a:p>
-            <a:r>
-              <a:rPr lang="de-DE" dirty="0"/>
-              <a:t>Nach Namen suchen (Suchindex):</a:t>
-            </a:r>
-            <a:br>
-              <a:rPr lang="de-DE" dirty="0"/>
-            </a:br>
-            <a:r>
-              <a:rPr lang="de-DE" sz="2400" dirty="0" err="1">
-                <a:solidFill>
-                  <a:srgbClr val="00B050"/>
-                </a:solidFill>
-                <a:latin typeface="Consolas" panose="020B0609020204030204" pitchFamily="49" charset="0"/>
-              </a:rPr>
-              <a:t>sudo</a:t>
-            </a:r>
-            <a:r>
-              <a:rPr lang="de-DE" sz="2400" dirty="0">
-                <a:solidFill>
-                  <a:srgbClr val="00B050"/>
-                </a:solidFill>
-                <a:latin typeface="Consolas" panose="020B0609020204030204" pitchFamily="49" charset="0"/>
-              </a:rPr>
-              <a:t> </a:t>
-            </a:r>
-            <a:r>
-              <a:rPr lang="de-DE" sz="2400" dirty="0" err="1">
-                <a:solidFill>
-                  <a:srgbClr val="00B050"/>
-                </a:solidFill>
-                <a:latin typeface="Consolas" panose="020B0609020204030204" pitchFamily="49" charset="0"/>
-              </a:rPr>
-              <a:t>apt</a:t>
-            </a:r>
-            <a:r>
-              <a:rPr lang="de-DE" sz="2400" dirty="0">
-                <a:solidFill>
-                  <a:srgbClr val="00B050"/>
-                </a:solidFill>
-                <a:latin typeface="Consolas" panose="020B0609020204030204" pitchFamily="49" charset="0"/>
-              </a:rPr>
-              <a:t> </a:t>
-            </a:r>
-            <a:r>
-              <a:rPr lang="de-DE" sz="2400" dirty="0" err="1">
-                <a:solidFill>
-                  <a:srgbClr val="00B050"/>
-                </a:solidFill>
-                <a:latin typeface="Consolas" panose="020B0609020204030204" pitchFamily="49" charset="0"/>
-              </a:rPr>
-              <a:t>install</a:t>
-            </a:r>
-            <a:r>
-              <a:rPr lang="de-DE" sz="2400" dirty="0">
-                <a:solidFill>
-                  <a:srgbClr val="00B050"/>
-                </a:solidFill>
-                <a:latin typeface="Consolas" panose="020B0609020204030204" pitchFamily="49" charset="0"/>
-              </a:rPr>
-              <a:t> </a:t>
-            </a:r>
-            <a:r>
-              <a:rPr lang="de-DE" sz="2400" dirty="0" err="1">
-                <a:solidFill>
-                  <a:srgbClr val="00B050"/>
-                </a:solidFill>
-                <a:latin typeface="Consolas" panose="020B0609020204030204" pitchFamily="49" charset="0"/>
-              </a:rPr>
-              <a:t>locate</a:t>
-            </a:r>
-            <a:br>
-              <a:rPr lang="de-DE" sz="2400" dirty="0">
-                <a:solidFill>
-                  <a:srgbClr val="00B050"/>
-                </a:solidFill>
-                <a:latin typeface="Consolas" panose="020B0609020204030204" pitchFamily="49" charset="0"/>
-              </a:rPr>
-            </a:br>
-            <a:r>
-              <a:rPr lang="de-DE" sz="2400" dirty="0" err="1">
-                <a:solidFill>
-                  <a:srgbClr val="00B050"/>
-                </a:solidFill>
-                <a:latin typeface="Consolas" panose="020B0609020204030204" pitchFamily="49" charset="0"/>
-              </a:rPr>
-              <a:t>sudo</a:t>
-            </a:r>
-            <a:r>
-              <a:rPr lang="de-DE" sz="2400" dirty="0">
-                <a:solidFill>
-                  <a:srgbClr val="00B050"/>
-                </a:solidFill>
-                <a:latin typeface="Consolas" panose="020B0609020204030204" pitchFamily="49" charset="0"/>
-              </a:rPr>
-              <a:t> </a:t>
-            </a:r>
-            <a:r>
-              <a:rPr lang="de-DE" sz="2400" dirty="0" err="1">
-                <a:solidFill>
-                  <a:srgbClr val="00B050"/>
-                </a:solidFill>
-                <a:latin typeface="Consolas" panose="020B0609020204030204" pitchFamily="49" charset="0"/>
-              </a:rPr>
-              <a:t>locate</a:t>
-            </a:r>
-            <a:r>
-              <a:rPr lang="de-DE" sz="2400" dirty="0">
-                <a:solidFill>
-                  <a:srgbClr val="00B050"/>
-                </a:solidFill>
-                <a:latin typeface="Consolas" panose="020B0609020204030204" pitchFamily="49" charset="0"/>
-              </a:rPr>
-              <a:t> </a:t>
-            </a:r>
-            <a:r>
-              <a:rPr lang="de-DE" sz="2400" dirty="0">
-                <a:solidFill>
-                  <a:schemeClr val="accent6"/>
-                </a:solidFill>
-                <a:latin typeface="Consolas" panose="020B0609020204030204" pitchFamily="49" charset="0"/>
-              </a:rPr>
-              <a:t>&lt;Name&gt;</a:t>
             </a:r>
           </a:p>
           <a:p>
@@ -18729,7 +18572,7 @@
           <a:p>
             <a:fld id="{691FC979-3F94-4691-BC89-32D13FC7EBCE}" type="datetime1">
               <a:rPr lang="de-DE" smtClean="0"/>
-              <a:t>18.02.2020</a:t>
+              <a:t>19.02.2020</a:t>
             </a:fld>
             <a:endParaRPr lang="de-DE"/>
           </a:p>
@@ -18919,7 +18762,7 @@
           <a:p>
             <a:fld id="{691FC979-3F94-4691-BC89-32D13FC7EBCE}" type="datetime1">
               <a:rPr lang="de-DE" smtClean="0"/>
-              <a:t>18.02.2020</a:t>
+              <a:t>19.02.2020</a:t>
             </a:fld>
             <a:endParaRPr lang="de-DE"/>
           </a:p>
@@ -19107,7 +18950,7 @@
           <a:p>
             <a:fld id="{691FC979-3F94-4691-BC89-32D13FC7EBCE}" type="datetime1">
               <a:rPr lang="de-DE" smtClean="0"/>
-              <a:t>18.02.2020</a:t>
+              <a:t>19.02.2020</a:t>
             </a:fld>
             <a:endParaRPr lang="de-DE"/>
           </a:p>
@@ -19449,7 +19292,7 @@
           <a:p>
             <a:fld id="{691FC979-3F94-4691-BC89-32D13FC7EBCE}" type="datetime1">
               <a:rPr lang="de-DE" smtClean="0"/>
-              <a:t>18.02.2020</a:t>
+              <a:t>19.02.2020</a:t>
             </a:fld>
             <a:endParaRPr lang="de-DE"/>
           </a:p>
@@ -19727,7 +19570,7 @@
           <a:p>
             <a:fld id="{691FC979-3F94-4691-BC89-32D13FC7EBCE}" type="datetime1">
               <a:rPr lang="de-DE" smtClean="0"/>
-              <a:t>18.02.2020</a:t>
+              <a:t>19.02.2020</a:t>
             </a:fld>
             <a:endParaRPr lang="de-DE"/>
           </a:p>
@@ -20057,7 +19900,7 @@
           <a:p>
             <a:fld id="{CBC55DA8-7BFB-46FD-BBA5-A6DF63369D11}" type="datetime1">
               <a:rPr lang="de-DE" smtClean="0"/>
-              <a:t>18.02.2020</a:t>
+              <a:t>19.02.2020</a:t>
             </a:fld>
             <a:endParaRPr lang="de-DE"/>
           </a:p>
@@ -20374,7 +20217,7 @@
           <a:p>
             <a:fld id="{CBC55DA8-7BFB-46FD-BBA5-A6DF63369D11}" type="datetime1">
               <a:rPr lang="de-DE" smtClean="0"/>
-              <a:t>18.02.2020</a:t>
+              <a:t>19.02.2020</a:t>
             </a:fld>
             <a:endParaRPr lang="de-DE"/>
           </a:p>
@@ -20472,7 +20315,7 @@
           <a:p>
             <a:fld id="{CBC55DA8-7BFB-46FD-BBA5-A6DF63369D11}" type="datetime1">
               <a:rPr lang="de-DE" smtClean="0"/>
-              <a:t>18.02.2020</a:t>
+              <a:t>19.02.2020</a:t>
             </a:fld>
             <a:endParaRPr lang="de-DE"/>
           </a:p>
@@ -21222,7 +21065,7 @@
           <a:p>
             <a:fld id="{691FC979-3F94-4691-BC89-32D13FC7EBCE}" type="datetime1">
               <a:rPr lang="de-DE" smtClean="0"/>
-              <a:t>18.02.2020</a:t>
+              <a:t>19.02.2020</a:t>
             </a:fld>
             <a:endParaRPr lang="de-DE"/>
           </a:p>
@@ -21409,7 +21252,7 @@
           <a:p>
             <a:fld id="{7CAB622F-8E15-4AA7-B23D-2D3C823960FD}" type="datetime1">
               <a:rPr lang="de-DE" smtClean="0"/>
-              <a:t>18.02.2020</a:t>
+              <a:t>19.02.2020</a:t>
             </a:fld>
             <a:endParaRPr lang="de-DE"/>
           </a:p>
@@ -21507,7 +21350,7 @@
           <a:p>
             <a:fld id="{08AC7274-303B-40A0-A9B4-04FCC19861B5}" type="datetime1">
               <a:rPr lang="de-DE" smtClean="0"/>
-              <a:t>18.02.2020</a:t>
+              <a:t>19.02.2020</a:t>
             </a:fld>
             <a:endParaRPr lang="de-DE"/>
           </a:p>
@@ -21868,7 +21711,7 @@
           <a:p>
             <a:fld id="{691FC979-3F94-4691-BC89-32D13FC7EBCE}" type="datetime1">
               <a:rPr lang="de-DE" smtClean="0"/>
-              <a:t>18.02.2020</a:t>
+              <a:t>19.02.2020</a:t>
             </a:fld>
             <a:endParaRPr lang="de-DE"/>
           </a:p>
@@ -22309,7 +22152,7 @@
           <a:p>
             <a:fld id="{691FC979-3F94-4691-BC89-32D13FC7EBCE}" type="datetime1">
               <a:rPr lang="de-DE" smtClean="0"/>
-              <a:t>18.02.2020</a:t>
+              <a:t>19.02.2020</a:t>
             </a:fld>
             <a:endParaRPr lang="de-DE"/>
           </a:p>
@@ -22466,7 +22309,7 @@
           <a:p>
             <a:fld id="{08AC7274-303B-40A0-A9B4-04FCC19861B5}" type="datetime1">
               <a:rPr lang="de-DE" smtClean="0"/>
-              <a:t>18.02.2020</a:t>
+              <a:t>19.02.2020</a:t>
             </a:fld>
             <a:endParaRPr lang="de-DE"/>
           </a:p>
@@ -22746,7 +22589,7 @@
           <a:p>
             <a:fld id="{691FC979-3F94-4691-BC89-32D13FC7EBCE}" type="datetime1">
               <a:rPr lang="de-DE" smtClean="0"/>
-              <a:t>18.02.2020</a:t>
+              <a:t>19.02.2020</a:t>
             </a:fld>
             <a:endParaRPr lang="de-DE"/>
           </a:p>
@@ -23113,7 +22956,7 @@
           <a:p>
             <a:fld id="{691FC979-3F94-4691-BC89-32D13FC7EBCE}" type="datetime1">
               <a:rPr lang="de-DE" smtClean="0"/>
-              <a:t>18.02.2020</a:t>
+              <a:t>19.02.2020</a:t>
             </a:fld>
             <a:endParaRPr lang="de-DE"/>
           </a:p>
@@ -23337,7 +23180,7 @@
           <a:p>
             <a:fld id="{691FC979-3F94-4691-BC89-32D13FC7EBCE}" type="datetime1">
               <a:rPr lang="de-DE" smtClean="0"/>
-              <a:t>18.02.2020</a:t>
+              <a:t>19.02.2020</a:t>
             </a:fld>
             <a:endParaRPr lang="de-DE"/>
           </a:p>
@@ -23618,7 +23461,7 @@
           <a:p>
             <a:fld id="{691FC979-3F94-4691-BC89-32D13FC7EBCE}" type="datetime1">
               <a:rPr lang="de-DE" smtClean="0"/>
-              <a:t>18.02.2020</a:t>
+              <a:t>19.02.2020</a:t>
             </a:fld>
             <a:endParaRPr lang="de-DE"/>
           </a:p>
@@ -23827,7 +23670,7 @@
           <a:p>
             <a:fld id="{691FC979-3F94-4691-BC89-32D13FC7EBCE}" type="datetime1">
               <a:rPr lang="de-DE" smtClean="0"/>
-              <a:t>18.02.2020</a:t>
+              <a:t>19.02.2020</a:t>
             </a:fld>
             <a:endParaRPr lang="de-DE"/>
           </a:p>
@@ -24132,7 +23975,7 @@
           <a:p>
             <a:fld id="{691FC979-3F94-4691-BC89-32D13FC7EBCE}" type="datetime1">
               <a:rPr lang="de-DE" smtClean="0"/>
-              <a:t>18.02.2020</a:t>
+              <a:t>19.02.2020</a:t>
             </a:fld>
             <a:endParaRPr lang="de-DE"/>
           </a:p>
@@ -24496,7 +24339,7 @@
           <a:p>
             <a:fld id="{7CAB622F-8E15-4AA7-B23D-2D3C823960FD}" type="datetime1">
               <a:rPr lang="de-DE" smtClean="0"/>
-              <a:t>18.02.2020</a:t>
+              <a:t>19.02.2020</a:t>
             </a:fld>
             <a:endParaRPr lang="de-DE"/>
           </a:p>
@@ -24594,7 +24437,7 @@
           <a:p>
             <a:fld id="{691FC979-3F94-4691-BC89-32D13FC7EBCE}" type="datetime1">
               <a:rPr lang="de-DE" smtClean="0"/>
-              <a:t>18.02.2020</a:t>
+              <a:t>19.02.2020</a:t>
             </a:fld>
             <a:endParaRPr lang="de-DE"/>
           </a:p>
@@ -24764,7 +24607,7 @@
           <a:p>
             <a:fld id="{691FC979-3F94-4691-BC89-32D13FC7EBCE}" type="datetime1">
               <a:rPr lang="de-DE" smtClean="0"/>
-              <a:t>18.02.2020</a:t>
+              <a:t>19.02.2020</a:t>
             </a:fld>
             <a:endParaRPr lang="de-DE"/>
           </a:p>
@@ -25214,7 +25057,7 @@
           <a:p>
             <a:fld id="{81CAA568-E4AD-43EC-8F2A-0AD1F2EE9220}" type="datetime1">
               <a:rPr lang="de-DE" smtClean="0"/>
-              <a:t>18.02.2020</a:t>
+              <a:t>19.02.2020</a:t>
             </a:fld>
             <a:endParaRPr lang="de-DE"/>
           </a:p>
@@ -25604,7 +25447,7 @@
           <a:p>
             <a:fld id="{81CAA568-E4AD-43EC-8F2A-0AD1F2EE9220}" type="datetime1">
               <a:rPr lang="de-DE" smtClean="0"/>
-              <a:t>18.02.2020</a:t>
+              <a:t>19.02.2020</a:t>
             </a:fld>
             <a:endParaRPr lang="de-DE"/>
           </a:p>
@@ -25877,7 +25720,7 @@
           <a:p>
             <a:fld id="{81CAA568-E4AD-43EC-8F2A-0AD1F2EE9220}" type="datetime1">
               <a:rPr lang="de-DE" smtClean="0"/>
-              <a:t>18.02.2020</a:t>
+              <a:t>19.02.2020</a:t>
             </a:fld>
             <a:endParaRPr lang="de-DE"/>
           </a:p>
@@ -26153,7 +25996,7 @@
           <a:p>
             <a:fld id="{81CAA568-E4AD-43EC-8F2A-0AD1F2EE9220}" type="datetime1">
               <a:rPr lang="de-DE" smtClean="0"/>
-              <a:t>18.02.2020</a:t>
+              <a:t>19.02.2020</a:t>
             </a:fld>
             <a:endParaRPr lang="de-DE"/>
           </a:p>
@@ -26297,7 +26140,7 @@
           <a:p>
             <a:fld id="{81F9AF91-D5A7-4DFB-9749-E97FA4AADD5C}" type="datetime1">
               <a:rPr lang="de-DE" smtClean="0"/>
-              <a:t>18.02.2020</a:t>
+              <a:t>19.02.2020</a:t>
             </a:fld>
             <a:endParaRPr lang="de-DE"/>
           </a:p>
@@ -26505,7 +26348,7 @@
           <a:p>
             <a:fld id="{CC6A951E-FE58-4A7B-8560-55DE4235FB0A}" type="datetime1">
               <a:rPr lang="de-DE" smtClean="0"/>
-              <a:t>18.02.2020</a:t>
+              <a:t>19.02.2020</a:t>
             </a:fld>
             <a:endParaRPr lang="de-DE"/>
           </a:p>
@@ -26755,7 +26598,7 @@
           <a:p>
             <a:fld id="{CBC55DA8-7BFB-46FD-BBA5-A6DF63369D11}" type="datetime1">
               <a:rPr lang="de-DE" smtClean="0"/>
-              <a:t>18.02.2020</a:t>
+              <a:t>19.02.2020</a:t>
             </a:fld>
             <a:endParaRPr lang="de-DE"/>
           </a:p>
@@ -26853,7 +26696,7 @@
           <a:p>
             <a:fld id="{CBC55DA8-7BFB-46FD-BBA5-A6DF63369D11}" type="datetime1">
               <a:rPr lang="de-DE" smtClean="0"/>
-              <a:t>18.02.2020</a:t>
+              <a:t>19.02.2020</a:t>
             </a:fld>
             <a:endParaRPr lang="de-DE"/>
           </a:p>
@@ -27146,7 +26989,7 @@
           <a:p>
             <a:fld id="{CBC55DA8-7BFB-46FD-BBA5-A6DF63369D11}" type="datetime1">
               <a:rPr lang="de-DE" smtClean="0"/>
-              <a:t>18.02.2020</a:t>
+              <a:t>19.02.2020</a:t>
             </a:fld>
             <a:endParaRPr lang="de-DE"/>
           </a:p>
@@ -27444,7 +27287,7 @@
           <a:p>
             <a:fld id="{CBC55DA8-7BFB-46FD-BBA5-A6DF63369D11}" type="datetime1">
               <a:rPr lang="de-DE" smtClean="0"/>
-              <a:t>18.02.2020</a:t>
+              <a:t>19.02.2020</a:t>
             </a:fld>
             <a:endParaRPr lang="de-DE"/>
           </a:p>
@@ -27542,7 +27385,7 @@
           <a:p>
             <a:fld id="{CBC55DA8-7BFB-46FD-BBA5-A6DF63369D11}" type="datetime1">
               <a:rPr lang="de-DE" smtClean="0"/>
-              <a:t>18.02.2020</a:t>
+              <a:t>19.02.2020</a:t>
             </a:fld>
             <a:endParaRPr lang="de-DE"/>
           </a:p>

</xml_diff>